<commit_message>
Remise Itération 1 (Update 4.4)
Remise officiel

Further update are just for aesthetic purposes
</commit_message>
<xml_diff>
--- a/MON SITE/documents/Diagramme et plan de navigation.pptx
+++ b/MON SITE/documents/Diagramme et plan de navigation.pptx
@@ -6,30 +6,31 @@
     <p:sldMasterId id="2147483660" r:id="rId2"/>
   </p:sldMasterIdLst>
   <p:notesMasterIdLst>
-    <p:notesMasterId r:id="rId8"/>
+    <p:notesMasterId r:id="rId9"/>
   </p:notesMasterIdLst>
   <p:sldIdLst>
     <p:sldId id="256" r:id="rId3"/>
     <p:sldId id="257" r:id="rId4"/>
     <p:sldId id="258" r:id="rId5"/>
-    <p:sldId id="279" r:id="rId6"/>
-    <p:sldId id="278" r:id="rId7"/>
+    <p:sldId id="280" r:id="rId6"/>
+    <p:sldId id="279" r:id="rId7"/>
+    <p:sldId id="278" r:id="rId8"/>
   </p:sldIdLst>
   <p:sldSz cx="9144000" cy="5143500" type="screen16x9"/>
   <p:notesSz cx="6858000" cy="9144000"/>
   <p:embeddedFontLst>
     <p:embeddedFont>
       <p:font typeface="Average" panose="020B0604020202020204" charset="0"/>
-      <p:regular r:id="rId9"/>
+      <p:regular r:id="rId10"/>
     </p:embeddedFont>
     <p:embeddedFont>
       <p:font typeface="Oswald" panose="00000500000000000000" pitchFamily="2" charset="0"/>
-      <p:regular r:id="rId10"/>
-      <p:bold r:id="rId11"/>
+      <p:regular r:id="rId11"/>
+      <p:bold r:id="rId12"/>
     </p:embeddedFont>
     <p:embeddedFont>
       <p:font typeface="Questrial" pitchFamily="2" charset="0"/>
-      <p:regular r:id="rId12"/>
+      <p:regular r:id="rId13"/>
     </p:embeddedFont>
   </p:embeddedFontLst>
   <p:defaultTextStyle>
@@ -1021,6 +1022,115 @@
 </file>
 
 <file path=ppt/notesSlides/notesSlide4.xml><?xml version="1.0" encoding="utf-8"?>
+<p:notes xmlns:a="http://schemas.openxmlformats.org/drawingml/2006/main" xmlns:r="http://schemas.openxmlformats.org/officeDocument/2006/relationships" xmlns:p="http://schemas.openxmlformats.org/presentationml/2006/main" showMasterSp="0" showMasterPhAnim="0">
+  <p:cSld>
+    <p:spTree>
+      <p:nvGrpSpPr>
+        <p:cNvPr id="1" name="Shape 61"/>
+        <p:cNvGrpSpPr/>
+        <p:nvPr/>
+      </p:nvGrpSpPr>
+      <p:grpSpPr>
+        <a:xfrm>
+          <a:off x="0" y="0"/>
+          <a:ext cx="0" cy="0"/>
+          <a:chOff x="0" y="0"/>
+          <a:chExt cx="0" cy="0"/>
+        </a:xfrm>
+      </p:grpSpPr>
+      <p:sp>
+        <p:nvSpPr>
+          <p:cNvPr id="62" name="Google Shape;62;g2f29f5208c_0_125:notes"/>
+          <p:cNvSpPr>
+            <a:spLocks noGrp="1" noRot="1" noChangeAspect="1"/>
+          </p:cNvSpPr>
+          <p:nvPr>
+            <p:ph type="sldImg" idx="2"/>
+          </p:nvPr>
+        </p:nvSpPr>
+        <p:spPr>
+          <a:xfrm>
+            <a:off x="381000" y="685800"/>
+            <a:ext cx="6096000" cy="3429000"/>
+          </a:xfrm>
+          <a:custGeom>
+            <a:avLst/>
+            <a:gdLst/>
+            <a:ahLst/>
+            <a:cxnLst/>
+            <a:rect l="l" t="t" r="r" b="b"/>
+            <a:pathLst>
+              <a:path w="120000" h="120000" extrusionOk="0">
+                <a:moveTo>
+                  <a:pt x="0" y="0"/>
+                </a:moveTo>
+                <a:lnTo>
+                  <a:pt x="120000" y="0"/>
+                </a:lnTo>
+                <a:lnTo>
+                  <a:pt x="120000" y="120000"/>
+                </a:lnTo>
+                <a:lnTo>
+                  <a:pt x="0" y="120000"/>
+                </a:lnTo>
+                <a:close/>
+              </a:path>
+            </a:pathLst>
+          </a:custGeom>
+        </p:spPr>
+      </p:sp>
+      <p:sp>
+        <p:nvSpPr>
+          <p:cNvPr id="63" name="Google Shape;63;g2f29f5208c_0_125:notes"/>
+          <p:cNvSpPr txBox="1">
+            <a:spLocks noGrp="1"/>
+          </p:cNvSpPr>
+          <p:nvPr>
+            <p:ph type="body" idx="1"/>
+          </p:nvPr>
+        </p:nvSpPr>
+        <p:spPr>
+          <a:xfrm>
+            <a:off x="685800" y="4343400"/>
+            <a:ext cx="5486400" cy="4114800"/>
+          </a:xfrm>
+          <a:prstGeom prst="rect">
+            <a:avLst/>
+          </a:prstGeom>
+        </p:spPr>
+        <p:txBody>
+          <a:bodyPr spcFirstLastPara="1" wrap="square" lIns="91425" tIns="91425" rIns="91425" bIns="91425" anchor="t" anchorCtr="0">
+            <a:noAutofit/>
+          </a:bodyPr>
+          <a:lstStyle/>
+          <a:p>
+            <a:pPr marL="0" lvl="0" indent="0" algn="l" rtl="0">
+              <a:spcBef>
+                <a:spcPts val="0"/>
+              </a:spcBef>
+              <a:spcAft>
+                <a:spcPts val="0"/>
+              </a:spcAft>
+              <a:buNone/>
+            </a:pPr>
+            <a:endParaRPr/>
+          </a:p>
+        </p:txBody>
+      </p:sp>
+    </p:spTree>
+    <p:extLst>
+      <p:ext uri="{BB962C8B-B14F-4D97-AF65-F5344CB8AC3E}">
+        <p14:creationId xmlns:p14="http://schemas.microsoft.com/office/powerpoint/2010/main" val="1890277308"/>
+      </p:ext>
+    </p:extLst>
+  </p:cSld>
+  <p:clrMapOvr>
+    <a:masterClrMapping/>
+  </p:clrMapOvr>
+</p:notes>
+</file>
+
+<file path=ppt/notesSlides/notesSlide5.xml><?xml version="1.0" encoding="utf-8"?>
 <p:notes xmlns:a="http://schemas.openxmlformats.org/drawingml/2006/main" xmlns:r="http://schemas.openxmlformats.org/officeDocument/2006/relationships" xmlns:p="http://schemas.openxmlformats.org/presentationml/2006/main" showMasterSp="0" showMasterPhAnim="0">
   <p:cSld>
     <p:spTree>
@@ -21865,10 +21975,10 @@
               <a:buNone/>
             </a:pPr>
             <a:r>
-              <a:rPr lang="fr"/>
+              <a:rPr lang="fr" dirty="0"/>
               <a:t>Diagramme et plan de navigation</a:t>
             </a:r>
-            <a:endParaRPr/>
+            <a:endParaRPr dirty="0"/>
           </a:p>
         </p:txBody>
       </p:sp>
@@ -21986,10 +22096,10 @@
               <a:buNone/>
             </a:pPr>
             <a:r>
-              <a:rPr lang="fr"/>
-              <a:t>Exemple de diagramme de navigation</a:t>
+              <a:rPr lang="fr" dirty="0"/>
+              <a:t>Diagramme de navigation</a:t>
             </a:r>
-            <a:endParaRPr/>
+            <a:endParaRPr dirty="0"/>
           </a:p>
         </p:txBody>
       </p:sp>
@@ -24701,7 +24811,7 @@
             </a:pPr>
             <a:r>
               <a:rPr lang="fr" dirty="0"/>
-              <a:t>Exemple de plan des URL (Site HiverQuebec.com)</a:t>
+              <a:t>Plan des URL (Site ConfusionMinecraftSmp.com)</a:t>
             </a:r>
             <a:endParaRPr dirty="0"/>
           </a:p>
@@ -24779,8 +24889,22 @@
               <a:buNone/>
             </a:pPr>
             <a:r>
-              <a:rPr lang="fr" sz="1000" dirty="0"/>
-              <a:t>www.hiverquebec.com/</a:t>
+              <a:rPr lang="fr" sz="1000" dirty="0">
+                <a:hlinkClick r:id="rId3"/>
+              </a:rPr>
+              <a:t>www.confusionminecraftsmp.com/</a:t>
+            </a:r>
+            <a:endParaRPr lang="fr" sz="1000" dirty="0"/>
+          </a:p>
+          <a:p>
+            <a:pPr marL="0" indent="0">
+              <a:buNone/>
+            </a:pPr>
+            <a:r>
+              <a:rPr lang="en-US" sz="1000" dirty="0">
+                <a:hlinkClick r:id="rId4"/>
+              </a:rPr>
+              <a:t>www.confusionminecraftsmp.com/informations/</a:t>
             </a:r>
             <a:endParaRPr sz="1000" dirty="0"/>
           </a:p>
@@ -24795,174 +24919,173 @@
               <a:buNone/>
             </a:pPr>
             <a:r>
-              <a:rPr lang="fr" sz="1000" dirty="0"/>
-              <a:t>www.hiverquebec.com/article/</a:t>
+              <a:rPr lang="en-US" sz="1000" dirty="0">
+                <a:hlinkClick r:id="rId5"/>
+              </a:rPr>
+              <a:t>www.confusionminecraftsmp.com/informations/info1/</a:t>
+            </a:r>
+            <a:endParaRPr lang="en-US" sz="1000" dirty="0"/>
+          </a:p>
+          <a:p>
+            <a:pPr marL="0" lvl="0" indent="0" algn="l" rtl="0">
+              <a:spcBef>
+                <a:spcPts val="0"/>
+              </a:spcBef>
+              <a:spcAft>
+                <a:spcPts val="0"/>
+              </a:spcAft>
+              <a:buNone/>
+            </a:pPr>
+            <a:r>
+              <a:rPr lang="en-US" sz="1000" dirty="0">
+                <a:hlinkClick r:id="rId6"/>
+              </a:rPr>
+              <a:t>www.confusionminecraftsmp.com/informations/info2/</a:t>
+            </a:r>
+            <a:endParaRPr lang="en-US" sz="1000" dirty="0"/>
+          </a:p>
+          <a:p>
+            <a:pPr marL="0" lvl="0" indent="0" algn="l" rtl="0">
+              <a:spcBef>
+                <a:spcPts val="0"/>
+              </a:spcBef>
+              <a:spcAft>
+                <a:spcPts val="0"/>
+              </a:spcAft>
+              <a:buNone/>
+            </a:pPr>
+            <a:r>
+              <a:rPr lang="en-US" sz="1000" dirty="0">
+                <a:hlinkClick r:id="rId7"/>
+              </a:rPr>
+              <a:t>www.confusionminecraftsmp.com/informations/info3/</a:t>
+            </a:r>
+            <a:endParaRPr lang="en-US" sz="1000" dirty="0"/>
+          </a:p>
+          <a:p>
+            <a:pPr marL="0" indent="0">
+              <a:buNone/>
+            </a:pPr>
+            <a:r>
+              <a:rPr lang="en-US" sz="1000" dirty="0">
+                <a:hlinkClick r:id="rId8"/>
+              </a:rPr>
+              <a:t>www.confusionminecraftsmp.</a:t>
+            </a:r>
+            <a:r>
+              <a:rPr lang="en-US" sz="1000">
+                <a:hlinkClick r:id="rId8"/>
+              </a:rPr>
+              <a:t>com/informations/info4</a:t>
+            </a:r>
+            <a:r>
+              <a:rPr lang="en-US" sz="1000" dirty="0">
+                <a:hlinkClick r:id="rId8"/>
+              </a:rPr>
+              <a:t>/</a:t>
+            </a:r>
+            <a:endParaRPr lang="en-US" sz="1000" dirty="0"/>
+          </a:p>
+          <a:p>
+            <a:pPr marL="0" lvl="0" indent="0" algn="l" rtl="0">
+              <a:spcBef>
+                <a:spcPts val="0"/>
+              </a:spcBef>
+              <a:spcAft>
+                <a:spcPts val="0"/>
+              </a:spcAft>
+              <a:buNone/>
+            </a:pPr>
+            <a:r>
+              <a:rPr lang="en-US" sz="1000" dirty="0">
+                <a:hlinkClick r:id="rId9"/>
+              </a:rPr>
+              <a:t>www.confusionminecraftsmp.com/mission/</a:t>
+            </a:r>
+            <a:endParaRPr lang="en-US" sz="1000" dirty="0"/>
+          </a:p>
+          <a:p>
+            <a:pPr marL="0" indent="0">
+              <a:buNone/>
+            </a:pPr>
+            <a:r>
+              <a:rPr lang="en-US" sz="1000" dirty="0">
+                <a:hlinkClick r:id="rId10"/>
+              </a:rPr>
+              <a:t>www.confusionminecraftsmp.com</a:t>
+            </a:r>
+            <a:r>
+              <a:rPr lang="fr" sz="1000" u="sng" dirty="0">
+                <a:solidFill>
+                  <a:schemeClr val="hlink"/>
+                </a:solidFill>
+                <a:hlinkClick r:id="rId10"/>
+              </a:rPr>
+              <a:t>/espace-membre/</a:t>
             </a:r>
             <a:endParaRPr sz="1000" dirty="0"/>
           </a:p>
           <a:p>
-            <a:pPr marL="0" lvl="0" indent="0" algn="l" rtl="0">
-              <a:spcBef>
-                <a:spcPts val="0"/>
-              </a:spcBef>
-              <a:spcAft>
-                <a:spcPts val="0"/>
-              </a:spcAft>
+            <a:pPr marL="0" indent="0">
               <a:buNone/>
             </a:pPr>
             <a:r>
-              <a:rPr lang="fr" sz="1000" dirty="0"/>
-              <a:t>www.hiverquebec.com/article/hiver-au-quebec/</a:t>
+              <a:rPr lang="en-US" sz="1000" dirty="0">
+                <a:hlinkClick r:id="rId11"/>
+              </a:rPr>
+              <a:t>www.confusionminecraftsmp.com</a:t>
             </a:r>
-            <a:endParaRPr sz="1000" dirty="0"/>
+            <a:r>
+              <a:rPr lang="fr" sz="1000" u="sng" dirty="0">
+                <a:solidFill>
+                  <a:schemeClr val="hlink"/>
+                </a:solidFill>
+                <a:hlinkClick r:id="rId11"/>
+              </a:rPr>
+              <a:t>/contact/</a:t>
+            </a:r>
+            <a:endParaRPr lang="fr" sz="1000" u="sng" dirty="0">
+              <a:solidFill>
+                <a:schemeClr val="hlink"/>
+              </a:solidFill>
+            </a:endParaRPr>
           </a:p>
           <a:p>
-            <a:pPr marL="0" lvl="0" indent="0" algn="l" rtl="0">
-              <a:spcBef>
-                <a:spcPts val="0"/>
-              </a:spcBef>
-              <a:spcAft>
-                <a:spcPts val="0"/>
-              </a:spcAft>
+            <a:pPr marL="0" indent="0">
               <a:buNone/>
             </a:pPr>
             <a:r>
-              <a:rPr lang="fr" sz="1000" u="sng" dirty="0">
-                <a:solidFill>
-                  <a:schemeClr val="hlink"/>
-                </a:solidFill>
-                <a:hlinkClick r:id="rId3"/>
+              <a:rPr lang="en-US" sz="1000" dirty="0">
+                <a:hlinkClick r:id="rId12"/>
               </a:rPr>
-              <a:t>www.hiverquebec.com/article/se-proteger-des-engelueres/</a:t>
+              <a:t>www.confusionminecraftsmp.com/faq/</a:t>
             </a:r>
-            <a:endParaRPr sz="1000" dirty="0"/>
+            <a:endParaRPr lang="en-US" sz="1000" dirty="0"/>
           </a:p>
           <a:p>
-            <a:pPr marL="0" lvl="0" indent="0" algn="l" rtl="0">
-              <a:spcBef>
-                <a:spcPts val="0"/>
-              </a:spcBef>
-              <a:spcAft>
-                <a:spcPts val="0"/>
-              </a:spcAft>
+            <a:pPr marL="0" indent="0">
               <a:buNone/>
             </a:pPr>
             <a:r>
-              <a:rPr lang="fr" sz="1000" u="sng" dirty="0">
-                <a:solidFill>
-                  <a:schemeClr val="hlink"/>
-                </a:solidFill>
-                <a:hlinkClick r:id="rId4"/>
+              <a:rPr lang="en-US" sz="1000" dirty="0">
+                <a:hlinkClick r:id="rId13"/>
               </a:rPr>
-              <a:t>www.hiverquebec.com/article/la-faune-en-hiver/</a:t>
-            </a:r>
-            <a:endParaRPr sz="1000" dirty="0"/>
-          </a:p>
-          <a:p>
-            <a:pPr marL="0" lvl="0" indent="0" algn="l" rtl="0">
-              <a:spcBef>
-                <a:spcPts val="0"/>
-              </a:spcBef>
-              <a:spcAft>
-                <a:spcPts val="0"/>
-              </a:spcAft>
-              <a:buNone/>
-            </a:pPr>
-            <a:r>
-              <a:rPr lang="fr" sz="1000" dirty="0"/>
-              <a:t>www.hiverquebec.</a:t>
+              <a:t>www.confusionminecraftsmp.com/</a:t>
             </a:r>
             <a:r>
-              <a:rPr lang="fr" sz="1000"/>
-              <a:t>com/mission/</a:t>
+              <a:rPr lang="fr" sz="1000" u="sng" dirty="0">
+                <a:solidFill>
+                  <a:schemeClr val="hlink"/>
+                </a:solidFill>
+                <a:hlinkClick r:id="rId13"/>
+              </a:rPr>
+              <a:t>mis-a-jour/</a:t>
             </a:r>
-            <a:endParaRPr sz="1000" dirty="0"/>
-          </a:p>
-          <a:p>
-            <a:pPr marL="0" lvl="0" indent="0" algn="l" rtl="0">
-              <a:spcBef>
-                <a:spcPts val="0"/>
-              </a:spcBef>
-              <a:spcAft>
-                <a:spcPts val="0"/>
-              </a:spcAft>
-              <a:buNone/>
-            </a:pPr>
-            <a:r>
-              <a:rPr lang="fr" sz="1000" u="sng" dirty="0">
-                <a:solidFill>
-                  <a:schemeClr val="hlink"/>
-                </a:solidFill>
-                <a:hlinkClick r:id="rId5"/>
-              </a:rPr>
-              <a:t>www.hiverquebec.com/espace-membre/</a:t>
-            </a:r>
-            <a:endParaRPr sz="1000" dirty="0"/>
-          </a:p>
-          <a:p>
-            <a:pPr marL="0" lvl="0" indent="0" algn="l" rtl="0">
-              <a:spcBef>
-                <a:spcPts val="0"/>
-              </a:spcBef>
-              <a:spcAft>
-                <a:spcPts val="0"/>
-              </a:spcAft>
-              <a:buNone/>
-            </a:pPr>
-            <a:r>
-              <a:rPr lang="fr" sz="1000" u="sng" dirty="0">
-                <a:solidFill>
-                  <a:schemeClr val="hlink"/>
-                </a:solidFill>
-                <a:hlinkClick r:id="rId6"/>
-              </a:rPr>
-              <a:t>www.hiverquegec.com/contact/</a:t>
-            </a:r>
-            <a:r>
-              <a:rPr lang="fr" sz="1000" dirty="0"/>
-              <a:t> </a:t>
-            </a:r>
-            <a:endParaRPr sz="1000" dirty="0"/>
-          </a:p>
-          <a:p>
-            <a:pPr marL="0" lvl="0" indent="0" algn="l" rtl="0">
-              <a:spcBef>
-                <a:spcPts val="0"/>
-              </a:spcBef>
-              <a:spcAft>
-                <a:spcPts val="0"/>
-              </a:spcAft>
-              <a:buNone/>
-            </a:pPr>
-            <a:r>
-              <a:rPr lang="fr" sz="1000" dirty="0"/>
-              <a:t> </a:t>
-            </a:r>
-            <a:endParaRPr sz="1000" dirty="0"/>
-          </a:p>
-          <a:p>
-            <a:pPr marL="0" lvl="0" indent="0" algn="l" rtl="0">
-              <a:spcBef>
-                <a:spcPts val="0"/>
-              </a:spcBef>
-              <a:spcAft>
-                <a:spcPts val="0"/>
-              </a:spcAft>
-              <a:buNone/>
-            </a:pPr>
-            <a:endParaRPr sz="1000" dirty="0"/>
-          </a:p>
-          <a:p>
-            <a:pPr marL="0" lvl="0" indent="0" algn="l" rtl="0">
-              <a:spcBef>
-                <a:spcPts val="0"/>
-              </a:spcBef>
-              <a:spcAft>
-                <a:spcPts val="0"/>
-              </a:spcAft>
-              <a:buNone/>
-            </a:pPr>
-            <a:endParaRPr sz="1000" dirty="0"/>
+            <a:endParaRPr lang="fr" sz="1000" u="sng" dirty="0">
+              <a:solidFill>
+                <a:schemeClr val="hlink"/>
+              </a:solidFill>
+            </a:endParaRPr>
           </a:p>
         </p:txBody>
       </p:sp>
@@ -24975,6 +25098,61 @@
 </file>
 
 <file path=ppt/slides/slide4.xml><?xml version="1.0" encoding="utf-8"?>
+<p:sld xmlns:a="http://schemas.openxmlformats.org/drawingml/2006/main" xmlns:r="http://schemas.openxmlformats.org/officeDocument/2006/relationships" xmlns:p="http://schemas.openxmlformats.org/presentationml/2006/main">
+  <p:cSld>
+    <p:spTree>
+      <p:nvGrpSpPr>
+        <p:cNvPr id="1" name="Shape 64"/>
+        <p:cNvGrpSpPr/>
+        <p:nvPr/>
+      </p:nvGrpSpPr>
+      <p:grpSpPr>
+        <a:xfrm>
+          <a:off x="0" y="0"/>
+          <a:ext cx="0" cy="0"/>
+          <a:chOff x="0" y="0"/>
+          <a:chExt cx="0" cy="0"/>
+        </a:xfrm>
+      </p:grpSpPr>
+      <p:sp>
+        <p:nvSpPr>
+          <p:cNvPr id="8" name="Title 7">
+            <a:extLst>
+              <a:ext uri="{FF2B5EF4-FFF2-40B4-BE49-F238E27FC236}">
+                <a16:creationId xmlns:a16="http://schemas.microsoft.com/office/drawing/2014/main" id="{9A8AF618-B354-FEE2-E981-8AD13A5F752F}"/>
+              </a:ext>
+            </a:extLst>
+          </p:cNvPr>
+          <p:cNvSpPr>
+            <a:spLocks noGrp="1"/>
+          </p:cNvSpPr>
+          <p:nvPr>
+            <p:ph type="title"/>
+          </p:nvPr>
+        </p:nvSpPr>
+        <p:spPr/>
+        <p:txBody>
+          <a:bodyPr/>
+          <a:lstStyle/>
+          <a:p>
+            <a:endParaRPr lang="en-US"/>
+          </a:p>
+        </p:txBody>
+      </p:sp>
+    </p:spTree>
+    <p:extLst>
+      <p:ext uri="{BB962C8B-B14F-4D97-AF65-F5344CB8AC3E}">
+        <p14:creationId xmlns:p14="http://schemas.microsoft.com/office/powerpoint/2010/main" val="2433113057"/>
+      </p:ext>
+    </p:extLst>
+  </p:cSld>
+  <p:clrMapOvr>
+    <a:masterClrMapping/>
+  </p:clrMapOvr>
+</p:sld>
+</file>
+
+<file path=ppt/slides/slide5.xml><?xml version="1.0" encoding="utf-8"?>
 <p:sld xmlns:a="http://schemas.openxmlformats.org/drawingml/2006/main" xmlns:r="http://schemas.openxmlformats.org/officeDocument/2006/relationships" xmlns:p="http://schemas.openxmlformats.org/presentationml/2006/main">
   <p:cSld>
     <p:bg>
@@ -28519,7 +28697,7 @@
 </p:sld>
 </file>
 
-<file path=ppt/slides/slide5.xml><?xml version="1.0" encoding="utf-8"?>
+<file path=ppt/slides/slide6.xml><?xml version="1.0" encoding="utf-8"?>
 <p:sld xmlns:a="http://schemas.openxmlformats.org/drawingml/2006/main" xmlns:r="http://schemas.openxmlformats.org/officeDocument/2006/relationships" xmlns:p="http://schemas.openxmlformats.org/presentationml/2006/main">
   <p:cSld>
     <p:spTree>

</xml_diff>

<commit_message>
Remise itération 1 (Update 4.5)
Petits tweaks
</commit_message>
<xml_diff>
--- a/MON SITE/documents/Diagramme et plan de navigation.pptx
+++ b/MON SITE/documents/Diagramme et plan de navigation.pptx
@@ -25135,7 +25135,11 @@
           <a:bodyPr/>
           <a:lstStyle/>
           <a:p>
-            <a:endParaRPr lang="en-US"/>
+            <a:r>
+              <a:rPr lang="fr-CA" dirty="0" err="1"/>
+              <a:t>empty</a:t>
+            </a:r>
+            <a:endParaRPr lang="en-US" dirty="0"/>
           </a:p>
         </p:txBody>
       </p:sp>

</xml_diff>